<commit_message>
Guide in Presentation Format.
Guide in Presentation Format.
</commit_message>
<xml_diff>
--- a/Presenation_TensorFlowOnWindows11forGPU.pptx
+++ b/Presenation_TensorFlowOnWindows11forGPU.pptx
@@ -5,7 +5,7 @@
     <p:sldMasterId id="2147483660" r:id="rId1"/>
   </p:sldMasterIdLst>
   <p:notesMasterIdLst>
-    <p:notesMasterId r:id="rId27"/>
+    <p:notesMasterId r:id="rId28"/>
   </p:notesMasterIdLst>
   <p:sldIdLst>
     <p:sldId id="256" r:id="rId2"/>
@@ -33,6 +33,7 @@
     <p:sldId id="271" r:id="rId24"/>
     <p:sldId id="274" r:id="rId25"/>
     <p:sldId id="275" r:id="rId26"/>
+    <p:sldId id="289" r:id="rId27"/>
   </p:sldIdLst>
   <p:sldSz cx="9144000" cy="6858000" type="screen4x3"/>
   <p:notesSz cx="6858000" cy="9144000"/>
@@ -319,9 +320,6 @@
           <a:bodyPr/>
           <a:lstStyle/>
           <a:p>
-            <a:endParaRPr dirty="0"/>
-          </a:p>
-          <a:p>
             <a:pPr marL="0" marR="0" lvl="0" indent="0" algn="l" defTabSz="914400" rtl="0" eaLnBrk="1" fontAlgn="auto" latinLnBrk="0" hangingPunct="1">
               <a:lnSpc>
                 <a:spcPct val="100000"/>
@@ -369,20 +367,23 @@
                 <a:ea typeface="+mn-ea"/>
                 <a:cs typeface="+mn-cs"/>
               </a:rPr>
-              <a:t>and want to leverage their GPU for processing TensorFlow workloads directly on their laptops. This guide assumes recent NVIDIA GPUs are installed on the Windows 11 laptop. </a:t>
-            </a:r>
-          </a:p>
-          <a:p>
-            <a:endParaRPr lang="en-US" dirty="0"/>
-          </a:p>
-          <a:p>
+              <a:t>and want to leverage their GPU for processing TensorFlow workloads directly on their laptops. This guide assumes a recent NVIDIA GPU is installed on the Windows 11 laptop. </a:t>
+            </a:r>
             <a:r>
               <a:rPr dirty="0"/>
-              <a:t>In this session, we’ll enable GPU acceleration for TensorFlow on Windows 11 using </a:t>
+              <a:t>In this session, we’ll </a:t>
             </a:r>
             <a:r>
               <a:rPr lang="en-US" dirty="0"/>
-              <a:t>the Windows Subsystem for Linux… we’ll refer to this as “</a:t>
+              <a:t>create a Linux development environment on your Windows 11 laptop.  Creating the Linux development environment provides a straightforward path to current TensorFlow GPU support and avoids some serious complexity in trying to set up TensorFlow directly on Windows.  We’ll </a:t>
+            </a:r>
+            <a:r>
+              <a:rPr dirty="0"/>
+              <a:t>enable GPU acceleration for TensorFlow on Windows 11 using </a:t>
+            </a:r>
+            <a:r>
+              <a:rPr lang="en-US" dirty="0"/>
+              <a:t>Ubuntu and the Windows Subsystem for Linux.  We’ll refer to the Windows Subsystem for Linux as “</a:t>
             </a:r>
             <a:r>
               <a:rPr dirty="0"/>
@@ -410,7 +411,31 @@
             </a:r>
             <a:r>
               <a:rPr dirty="0"/>
-              <a:t> NVIDIA driver on Windows, set up WSL2 with Ubuntu, install CUDA inside Linux, create a Python environment, install TensorFlow with GPU support, and verify </a:t>
+              <a:t> NVIDIA driver on Windows, </a:t>
+            </a:r>
+            <a:r>
+              <a:rPr lang="en-US" dirty="0"/>
+              <a:t>install </a:t>
+            </a:r>
+            <a:r>
+              <a:rPr dirty="0"/>
+              <a:t>WSL2</a:t>
+            </a:r>
+            <a:r>
+              <a:rPr lang="en-US" dirty="0"/>
+              <a:t>,</a:t>
+            </a:r>
+            <a:r>
+              <a:rPr dirty="0"/>
+              <a:t> </a:t>
+            </a:r>
+            <a:r>
+              <a:rPr lang="en-US" dirty="0"/>
+              <a:t>install Linux via </a:t>
+            </a:r>
+            <a:r>
+              <a:rPr dirty="0"/>
+              <a:t>Ubuntu, install CUDA inside Linux, create a Python environment, install TensorFlow with GPU support, and verify </a:t>
             </a:r>
             <a:r>
               <a:rPr lang="en-US" dirty="0"/>
@@ -487,83 +512,10 @@
           <a:bodyPr/>
           <a:lstStyle/>
           <a:p>
-            <a:endParaRPr dirty="0"/>
-          </a:p>
-          <a:p>
             <a:r>
               <a:rPr lang="en-US" dirty="0"/>
-              <a:t>In this section we install the appropriate </a:t>
-            </a:r>
-            <a:r>
-              <a:rPr dirty="0"/>
-              <a:t>CUDA minor version compatible with </a:t>
-            </a:r>
-            <a:r>
-              <a:rPr lang="en-US" dirty="0"/>
-              <a:t>the</a:t>
-            </a:r>
-            <a:r>
-              <a:rPr dirty="0"/>
-              <a:t> driver</a:t>
-            </a:r>
-            <a:r>
-              <a:rPr lang="en-US" dirty="0"/>
-              <a:t> to work in the WSL2 environment</a:t>
-            </a:r>
-            <a:r>
-              <a:rPr dirty="0"/>
-              <a:t>.</a:t>
-            </a:r>
-            <a:r>
-              <a:rPr lang="en-US" dirty="0"/>
-              <a:t> </a:t>
-            </a:r>
-            <a:r>
-              <a:rPr dirty="0"/>
-              <a:t> </a:t>
-            </a:r>
-            <a:r>
-              <a:rPr lang="en-US" dirty="0"/>
-              <a:t>While this version shows CUDA version 12.9, you should be able to adjust the commands for the minor version if needed.  My GPU Driver is compatible with CUDA version 12.9.</a:t>
-            </a:r>
-          </a:p>
-          <a:p>
-            <a:endParaRPr lang="en-US" dirty="0"/>
-          </a:p>
-          <a:p>
-            <a:pPr marL="0" marR="0" lvl="0" indent="0" algn="l" defTabSz="914400" rtl="0" eaLnBrk="1" fontAlgn="auto" latinLnBrk="0" hangingPunct="1">
-              <a:lnSpc>
-                <a:spcPct val="100000"/>
-              </a:lnSpc>
-              <a:spcBef>
-                <a:spcPts val="0"/>
-              </a:spcBef>
-              <a:spcAft>
-                <a:spcPts val="0"/>
-              </a:spcAft>
-              <a:buClrTx/>
-              <a:buSzTx/>
-              <a:buFontTx/>
-              <a:buNone/>
-              <a:tabLst/>
-              <a:defRPr/>
-            </a:pPr>
-            <a:r>
-              <a:rPr lang="en-US" sz="1200" u="none" strike="noStrike" kern="1200" dirty="0">
-                <a:solidFill>
-                  <a:schemeClr val="tx1"/>
-                </a:solidFill>
-                <a:effectLst/>
-                <a:latin typeface="+mn-lt"/>
-                <a:ea typeface="+mn-ea"/>
-                <a:cs typeface="+mn-cs"/>
-              </a:rPr>
-              <a:t>Install the NVIDIA CUDA toolkit by executing the following commands one by one in sequence in the WSL2 Ubuntu terminal:</a:t>
-            </a:r>
-            <a:endParaRPr lang="en-US" dirty="0"/>
-          </a:p>
-          <a:p>
-            <a:endParaRPr lang="en-US" dirty="0"/>
+              <a:t>In this section we install the appropriate CUDA minor version compatible with the NVIDIA driver using the Ubuntu terminal. My GPU Driver is compatible with CUDA version 12.9. You can adjust the commands to use a earlier minor version if needed.  Install the NVIDIA CUDA toolkit by executing the following commands one by one in sequence. </a:t>
+            </a:r>
           </a:p>
           <a:p>
             <a:endParaRPr dirty="0"/>
@@ -634,9 +586,6 @@
           <a:bodyPr/>
           <a:lstStyle/>
           <a:p>
-            <a:endParaRPr dirty="0"/>
-          </a:p>
-          <a:p>
             <a:pPr lvl="0"/>
             <a:r>
               <a:rPr lang="en-US" sz="1200" u="none" strike="noStrike" kern="1200" dirty="0">
@@ -648,7 +597,7 @@
                 <a:ea typeface="+mn-ea"/>
                 <a:cs typeface="+mn-cs"/>
               </a:rPr>
-              <a:t>Configure CUDA Environment Variables in WSL2 by executing the following commands one by one in sequence in the WSL2 Ubuntu terminal.</a:t>
+              <a:t>Configure CUDA Environment Variables in WSL2 by executing the following commands one by one in sequence in the Ubuntu terminal.</a:t>
             </a:r>
           </a:p>
         </p:txBody>
@@ -749,7 +698,7 @@
                 <a:ea typeface="+mn-ea"/>
                 <a:cs typeface="+mn-cs"/>
               </a:rPr>
-              <a:t>the following commands one by one in sequence in the WSL2 Ubuntu terminal to verify the CUDA Version and path to CUDA libraries.</a:t>
+              <a:t>the following commands one by one in sequence in the Ubuntu terminal to verify the CUDA Version and path to CUDA libraries.</a:t>
             </a:r>
           </a:p>
         </p:txBody>
@@ -829,12 +778,25 @@
           <a:bodyPr/>
           <a:lstStyle/>
           <a:p>
-            <a:endParaRPr dirty="0"/>
-          </a:p>
-          <a:p>
             <a:r>
               <a:rPr dirty="0"/>
-              <a:t>Next we’ll create a clean Python environment and install a TensorFlow build that bundles the proper CUDA and cuDNN versions. This keeps dependencies isolated and reproducible.</a:t>
+              <a:t>Next</a:t>
+            </a:r>
+            <a:r>
+              <a:rPr lang="en-US" dirty="0"/>
+              <a:t>,</a:t>
+            </a:r>
+            <a:r>
+              <a:rPr dirty="0"/>
+              <a:t> we’ll create a clean Python environment</a:t>
+            </a:r>
+            <a:r>
+              <a:rPr lang="en-US" dirty="0"/>
+              <a:t> in our Ubuntu on WSL2 environment</a:t>
+            </a:r>
+            <a:r>
+              <a:rPr dirty="0"/>
+              <a:t> and install a TensorFlow build that bundles the proper CUDA and cuDNN versions. This keeps dependencies isolated and reproducible.</a:t>
             </a:r>
           </a:p>
         </p:txBody>
@@ -925,7 +887,7 @@
             </a:pPr>
             <a:r>
               <a:rPr lang="en-US" dirty="0"/>
-              <a:t>First, we need to install and initialize Miniconda for Linux in the Ubuntu / WSL2 environment. </a:t>
+              <a:t>First, we need to install and initialize Miniconda for Linux in the Ubuntu environment. </a:t>
             </a:r>
             <a:r>
               <a:rPr lang="en-US" sz="1200" u="none" strike="noStrike" kern="1200" dirty="0">
@@ -949,7 +911,7 @@
                 <a:ea typeface="+mn-ea"/>
                 <a:cs typeface="+mn-cs"/>
               </a:rPr>
-              <a:t>th</a:t>
+              <a:t>th </a:t>
             </a:r>
             <a:r>
               <a:rPr lang="en-US" sz="1200" u="none" strike="noStrike" kern="1200" dirty="0">
@@ -961,7 +923,7 @@
                 <a:ea typeface="+mn-ea"/>
                 <a:cs typeface="+mn-cs"/>
               </a:rPr>
-              <a:t> command to verify Miniconda was installed properly.</a:t>
+              <a:t>command to verify Miniconda was installed properly.</a:t>
             </a:r>
           </a:p>
           <a:p>
@@ -1109,7 +1071,7 @@
           <a:p>
             <a:r>
               <a:rPr lang="en-US" dirty="0"/>
-              <a:t>Use Conda to create a Python environment.  Be sure to use Python version 3.10.  </a:t>
+              <a:t>Use Conda to create a Python environment in the Ubuntu terminal.  Be sure to use Python version 3.10.  </a:t>
             </a:r>
             <a:r>
               <a:rPr lang="en-US" sz="1200" u="none" strike="noStrike" kern="1200" dirty="0">
@@ -1121,7 +1083,7 @@
                 <a:ea typeface="+mn-ea"/>
                 <a:cs typeface="+mn-cs"/>
               </a:rPr>
-              <a:t>Execute these commands one by one in sequence to create, activate and validate the new conda environment.</a:t>
+              <a:t>Execute these commands one by one in sequence to create, validate and activate the new conda environment.</a:t>
             </a:r>
           </a:p>
           <a:p>
@@ -1252,7 +1214,7 @@
           <a:p>
             <a:r>
               <a:rPr lang="en-US" dirty="0"/>
-              <a:t>With the new conda Python environment activated, install </a:t>
+              <a:t>With the new conda Python environment activated, we will install </a:t>
             </a:r>
             <a:r>
               <a:rPr dirty="0"/>
@@ -1383,7 +1345,7 @@
             </a:pPr>
             <a:r>
               <a:rPr lang="en-US" dirty="0"/>
-              <a:t>Next, we will validate Remote-WSL, select the Python interpreter, and run some test code to validate the environment.</a:t>
+              <a:t>Next, we will validate that the Ubuntu environment can be used to develop in the VS Code application installed on the Windows 11 laptop.  To do this, VS Code needs to recognize the Ubuntu environment as a remote development environment, even though it is running locally on the windows machine.  This is sometimes referred to as “Remote WSL2”.  Once we confirm that VS Code can work with the Ubuntu environment, we’ll select the Python interpreter we created for the TensorFlow environment and run test code.</a:t>
             </a:r>
           </a:p>
           <a:p>
@@ -1458,25 +1420,10 @@
           <a:bodyPr/>
           <a:lstStyle/>
           <a:p>
-            <a:endParaRPr lang="en-US" dirty="0"/>
-          </a:p>
-          <a:p>
             <a:r>
               <a:rPr lang="en-US" dirty="0"/>
-              <a:t>This is a quick and easy way to launch VS Code from a directory location within the Ubuntu (WSL2) Terminal.  This allows you to launch Ubuntu, navigate to the project directory, and quickly launch a VS Code instance to begin working in that directory.  Ater running the command, ensure "WSL: Ubuntu" appears in the lower-left corner.   This confirms Remote WSL is working.</a:t>
-            </a:r>
-          </a:p>
-          <a:p>
-            <a:endParaRPr lang="en-US" dirty="0"/>
-          </a:p>
-          <a:p>
-            <a:r>
-              <a:rPr lang="en-US" dirty="0"/>
-              <a:t>At this point, take a moment to ensure the VS Code Python Extension is installed in the VS Code environment.  Use the left-hand menu to select extensions and search for Python.  Locate the Python Extension from Microsoft and install it if it is not yet installed.</a:t>
-            </a:r>
-          </a:p>
-          <a:p>
-            <a:endParaRPr lang="en-US" dirty="0"/>
+              <a:t>In the Ubuntu terminal, navigate to a working directory and execute the code command to launch VS Code.  This will launch a VS Code instance and should load the WSL: Ubuntu environment as a remote development environment.  Ater running the command, ensure "WSL: Ubuntu" appears in the lower-left corner.   This confirms Remote WSL is working. If you are not a regular VS Code user for Python development, take a moment to ensure the VS Code Python Extension is installed in the VS Code environment.  Use the left-hand menu to select extensions and search for Python.  Locate the Python Extension from Microsoft and install it if it is not yet installed.</a:t>
+            </a:r>
           </a:p>
         </p:txBody>
       </p:sp>
@@ -1544,9 +1491,6 @@
           <a:bodyPr/>
           <a:lstStyle/>
           <a:p>
-            <a:endParaRPr dirty="0"/>
-          </a:p>
-          <a:p>
             <a:r>
               <a:rPr dirty="0"/>
               <a:t>Finally, let’s verify TensorFlow sees the GPU and can compute on it. We’ll list physical and logical GPUs, confirm CUDA is built, and run a small matrix multiplication.</a:t>
@@ -1646,13 +1590,8 @@
                 <a:ea typeface="+mn-ea"/>
                 <a:cs typeface="+mn-cs"/>
               </a:rPr>
-              <a:t>TensorFlow versions 2.11 and newer no longer provide native, direct GPU support for Windows.</a:t>
-            </a:r>
-          </a:p>
-          <a:p>
-            <a:endParaRPr dirty="0"/>
-          </a:p>
-          <a:p>
+              <a:t>So, why do we need to use Linux on Windows?  TensorFlow versions 2.11 and newer no longer provide native, direct GPU support for Windows.  </a:t>
+            </a:r>
             <a:r>
               <a:rPr dirty="0"/>
               <a:t>TensorFlow has phased out native Windows GPU </a:t>
@@ -1673,66 +1612,7 @@
               <a:rPr dirty="0"/>
               <a:t>. </a:t>
             </a:r>
-            <a:r>
-              <a:rPr lang="en-US" dirty="0"/>
-              <a:t> </a:t>
-            </a:r>
-          </a:p>
-          <a:p>
             <a:endParaRPr lang="en-US" dirty="0"/>
-          </a:p>
-          <a:p>
-            <a:r>
-              <a:rPr lang="en-US" dirty="0"/>
-              <a:t>I recommend using the Windows Subsystem for Linux </a:t>
-            </a:r>
-            <a:r>
-              <a:rPr dirty="0"/>
-              <a:t>2 </a:t>
-            </a:r>
-            <a:r>
-              <a:rPr lang="en-US" dirty="0"/>
-              <a:t>as it more natively supports TensorFlow and </a:t>
-            </a:r>
-            <a:r>
-              <a:rPr dirty="0"/>
-              <a:t>provides a lightweight Linux environment on Windows with direct GPU passthrough</a:t>
-            </a:r>
-            <a:r>
-              <a:rPr lang="en-US" dirty="0"/>
-              <a:t> – enabling the </a:t>
-            </a:r>
-            <a:r>
-              <a:rPr dirty="0"/>
-              <a:t>officially supported Linux TensorFlow builds</a:t>
-            </a:r>
-            <a:r>
-              <a:rPr lang="en-US" dirty="0"/>
-              <a:t> on Windows</a:t>
-            </a:r>
-            <a:r>
-              <a:rPr dirty="0"/>
-              <a:t>.</a:t>
-            </a:r>
-            <a:r>
-              <a:rPr lang="en-US" dirty="0"/>
-              <a:t>  </a:t>
-            </a:r>
-            <a:br>
-              <a:rPr lang="en-US" dirty="0"/>
-            </a:br>
-            <a:endParaRPr lang="en-US" dirty="0"/>
-          </a:p>
-          <a:p>
-            <a:r>
-              <a:rPr dirty="0"/>
-              <a:t>We’ll keep things minimal and reproducible so you can follow step by step</a:t>
-            </a:r>
-            <a:r>
-              <a:rPr lang="en-US" dirty="0"/>
-              <a:t> to set this up on your own Windows 11 environment.</a:t>
-            </a:r>
-            <a:endParaRPr dirty="0"/>
           </a:p>
         </p:txBody>
       </p:sp>
@@ -1820,7 +1700,15 @@
           <a:p>
             <a:r>
               <a:rPr lang="en-US" dirty="0"/>
-              <a:t>I have provided a GitHub repository containing the Python test file that can be used to validate a workload is being processed on the NVIDIA GPU.  You can access the file at the repository indicated here and re-use the code on your laptop.</a:t>
+              <a:t>Create a test .</a:t>
+            </a:r>
+            <a:r>
+              <a:rPr lang="en-US" dirty="0" err="1"/>
+              <a:t>py</a:t>
+            </a:r>
+            <a:r>
+              <a:rPr lang="en-US" dirty="0"/>
+              <a:t> file in the Ubuntu working directory from within VS Code.  I have provided a GitHub repository containing the Python test file that can be used to validate a workload is being processed on the NVIDIA GPU.  You can access the file at the repository indicated here and re-use the code on your laptop.</a:t>
             </a:r>
             <a:endParaRPr dirty="0"/>
           </a:p>
@@ -2023,7 +1911,7 @@
           <a:p>
             <a:r>
               <a:rPr lang="en-US" dirty="0"/>
-              <a:t>For a quick check, you can open up the task manager and watch the processes occurring on the GPU.</a:t>
+              <a:t>For a quick check to validate code is running on the GPU visually, you can open up the task manager and watch the processes occurring on the GPU.</a:t>
             </a:r>
             <a:endParaRPr dirty="0"/>
           </a:p>
@@ -2095,15 +1983,7 @@
           <a:p>
             <a:r>
               <a:rPr lang="en-US" dirty="0"/>
-              <a:t>Run the test file in VS code inside the Ubuntu WSL environment with the correct python interpreter environment selected.   Watch the terminal output for the messages in the file to ensure that the file processes correctly.  At this time, you should see a spike in memory on the GPU in the task manager.  If the file runs successfully, and you see activity in the performance monitor for the GPU, the environment is set up correctly.  You can now use </a:t>
-            </a:r>
-            <a:r>
-              <a:rPr lang="en-US"/>
-              <a:t>this Ubuntu </a:t>
-            </a:r>
-            <a:r>
-              <a:rPr lang="en-US" dirty="0"/>
-              <a:t>/ WSL2 / Python environment for creating TensorFlow projects that leverage your GPU.</a:t>
+              <a:t>And now, the moment we’ve been waiting for… test to see if the TensorFlow code will run on the GPU.  Run the test file in VS code inside the Ubuntu WSL environment with the Python TensorFlow environment we created selected as the active Python interpreter.   Watch the terminal output for the messages in the file to ensure that the file processes correctly.  At this time, you should see a spike in memory on the GPU in the task manager.  Watch the interpreter terminal window in VS Code and validate the processing occurs and the messages confirm the GPU was utilized.  If the file runs successfully, and you see activity in the performance monitor for the GPU, the environment is set up to properly leverage the GPU for TensorFlow workloads.  You can now use this Ubuntu / WSL2 / Python environment for creating TensorFlow projects that leverage your GPU.</a:t>
             </a:r>
             <a:endParaRPr dirty="0"/>
           </a:p>
@@ -2175,12 +2055,6 @@
           <a:p>
             <a:endParaRPr dirty="0"/>
           </a:p>
-          <a:p>
-            <a:r>
-              <a:rPr dirty="0"/>
-              <a:t>Let’s review common pitfalls and how to resolve them, then summarize the workflow.</a:t>
-            </a:r>
-          </a:p>
         </p:txBody>
       </p:sp>
       <p:sp>
@@ -2247,9 +2121,6 @@
           <a:bodyPr/>
           <a:lstStyle/>
           <a:p>
-            <a:endParaRPr dirty="0"/>
-          </a:p>
-          <a:p>
             <a:r>
               <a:rPr dirty="0"/>
               <a:t>If TensorFlow does not see the GPU, confirm the </a:t>
@@ -2286,6 +2157,11 @@
               <a:rPr dirty="0"/>
               <a:t>is selected. </a:t>
             </a:r>
+            <a:r>
+              <a:rPr lang="en-US" dirty="0"/>
+              <a:t> Additional research may be required to match the NVIDIA driver and CUDA compatibility.</a:t>
+            </a:r>
+            <a:endParaRPr dirty="0"/>
           </a:p>
         </p:txBody>
       </p:sp>
@@ -2302,6 +2178,103 @@
         <p:spPr/>
       </p:sp>
     </p:spTree>
+  </p:cSld>
+  <p:clrMapOvr>
+    <a:masterClrMapping/>
+  </p:clrMapOvr>
+</p:notes>
+</file>
+
+<file path=ppt/notesSlides/notesSlide26.xml><?xml version="1.0" encoding="utf-8"?>
+<p:notes xmlns:a="http://schemas.openxmlformats.org/drawingml/2006/main" xmlns:r="http://schemas.openxmlformats.org/officeDocument/2006/relationships" xmlns:p="http://schemas.openxmlformats.org/presentationml/2006/main">
+  <p:cSld>
+    <p:spTree>
+      <p:nvGrpSpPr>
+        <p:cNvPr id="1" name="">
+          <a:extLst>
+            <a:ext uri="{FF2B5EF4-FFF2-40B4-BE49-F238E27FC236}">
+              <a16:creationId xmlns:a16="http://schemas.microsoft.com/office/drawing/2014/main" id="{535189BC-F852-29B6-0532-1FAD768BE17F}"/>
+            </a:ext>
+          </a:extLst>
+        </p:cNvPr>
+        <p:cNvGrpSpPr/>
+        <p:nvPr/>
+      </p:nvGrpSpPr>
+      <p:grpSpPr>
+        <a:xfrm>
+          <a:off x="0" y="0"/>
+          <a:ext cx="0" cy="0"/>
+          <a:chOff x="0" y="0"/>
+          <a:chExt cx="0" cy="0"/>
+        </a:xfrm>
+      </p:grpSpPr>
+      <p:sp>
+        <p:nvSpPr>
+          <p:cNvPr id="2" name="Slide Image Placeholder 1">
+            <a:extLst>
+              <a:ext uri="{FF2B5EF4-FFF2-40B4-BE49-F238E27FC236}">
+                <a16:creationId xmlns:a16="http://schemas.microsoft.com/office/drawing/2014/main" id="{B11BA744-2CAD-E46A-8F10-1D8D0FE961F9}"/>
+              </a:ext>
+            </a:extLst>
+          </p:cNvPr>
+          <p:cNvSpPr>
+            <a:spLocks noGrp="1" noRot="1" noChangeAspect="1"/>
+          </p:cNvSpPr>
+          <p:nvPr>
+            <p:ph type="sldImg" idx="2"/>
+          </p:nvPr>
+        </p:nvSpPr>
+        <p:spPr/>
+      </p:sp>
+      <p:sp>
+        <p:nvSpPr>
+          <p:cNvPr id="3" name="Notes Placeholder 2">
+            <a:extLst>
+              <a:ext uri="{FF2B5EF4-FFF2-40B4-BE49-F238E27FC236}">
+                <a16:creationId xmlns:a16="http://schemas.microsoft.com/office/drawing/2014/main" id="{4718A9F4-2623-217E-CCE3-117CBFBAF930}"/>
+              </a:ext>
+            </a:extLst>
+          </p:cNvPr>
+          <p:cNvSpPr>
+            <a:spLocks noGrp="1"/>
+          </p:cNvSpPr>
+          <p:nvPr>
+            <p:ph type="body" sz="quarter" idx="3"/>
+          </p:nvPr>
+        </p:nvSpPr>
+        <p:spPr/>
+        <p:txBody>
+          <a:bodyPr/>
+          <a:lstStyle/>
+          <a:p>
+            <a:endParaRPr dirty="0"/>
+          </a:p>
+        </p:txBody>
+      </p:sp>
+      <p:sp>
+        <p:nvSpPr>
+          <p:cNvPr id="4" name="Slide Number Placeholder 3">
+            <a:extLst>
+              <a:ext uri="{FF2B5EF4-FFF2-40B4-BE49-F238E27FC236}">
+                <a16:creationId xmlns:a16="http://schemas.microsoft.com/office/drawing/2014/main" id="{0D7305AC-A174-7101-AAB9-5280DE1DCE3D}"/>
+              </a:ext>
+            </a:extLst>
+          </p:cNvPr>
+          <p:cNvSpPr>
+            <a:spLocks noGrp="1"/>
+          </p:cNvSpPr>
+          <p:nvPr>
+            <p:ph type="sldNum" sz="quarter" idx="5"/>
+          </p:nvPr>
+        </p:nvSpPr>
+        <p:spPr/>
+      </p:sp>
+    </p:spTree>
+    <p:extLst>
+      <p:ext uri="{BB962C8B-B14F-4D97-AF65-F5344CB8AC3E}">
+        <p14:creationId xmlns:p14="http://schemas.microsoft.com/office/powerpoint/2010/main" val="2038326963"/>
+      </p:ext>
+    </p:extLst>
   </p:cSld>
   <p:clrMapOvr>
     <a:masterClrMapping/>
@@ -2353,9 +2326,27 @@
           <a:bodyPr/>
           <a:lstStyle/>
           <a:p>
-            <a:endParaRPr dirty="0"/>
-          </a:p>
-          <a:p>
+            <a:pPr marL="0" marR="0" lvl="0" indent="0" algn="l" defTabSz="914400" rtl="0" eaLnBrk="1" fontAlgn="auto" latinLnBrk="0" hangingPunct="1">
+              <a:lnSpc>
+                <a:spcPct val="100000"/>
+              </a:lnSpc>
+              <a:spcBef>
+                <a:spcPts val="0"/>
+              </a:spcBef>
+              <a:spcAft>
+                <a:spcPts val="0"/>
+              </a:spcAft>
+              <a:buClrTx/>
+              <a:buSzTx/>
+              <a:buFontTx/>
+              <a:buNone/>
+              <a:tabLst/>
+              <a:defRPr/>
+            </a:pPr>
+            <a:r>
+              <a:rPr lang="en-US" dirty="0"/>
+              <a:t>In the industry, most deep learning frameworks target Linux first, so this approach is reliable and provides some visibility into working with data science project environments and code on Linux. </a:t>
+            </a:r>
             <a:r>
               <a:rPr dirty="0"/>
               <a:t>WSL2 runs a real Linux kernel side by side with Windows, giving you near-native performance, package managers, standard Linux tooling</a:t>
@@ -2375,21 +2366,6 @@
           </a:p>
           <a:p>
             <a:endParaRPr lang="en-US" dirty="0"/>
-          </a:p>
-          <a:p>
-            <a:r>
-              <a:rPr lang="en-US" dirty="0"/>
-              <a:t>In the industry, m</a:t>
-            </a:r>
-            <a:r>
-              <a:rPr dirty="0"/>
-              <a:t>ost deep learning frameworks target Linux first, so this approach is reliable</a:t>
-            </a:r>
-            <a:r>
-              <a:rPr lang="en-US" dirty="0"/>
-              <a:t> and provides some visibility into working with data science project environments and code on Linux.</a:t>
-            </a:r>
-            <a:endParaRPr dirty="0"/>
           </a:p>
         </p:txBody>
       </p:sp>
@@ -2477,7 +2453,7 @@
           <a:p>
             <a:r>
               <a:rPr lang="en-US" dirty="0"/>
-              <a:t>By following the steps in this tutorial, I successfully established an environment to run TensorFlow workloads on my laptop GPU.  These were my starting environment specifications.  </a:t>
+              <a:t>By following the steps in this tutorial, I successfully established an environment to run TensorFlow workloads on my laptop GPU.  These were my starting environment specifications for reference.  If your specifications are significantly different, you may consider doing additional research before executing the steps of this guide.</a:t>
             </a:r>
             <a:endParaRPr dirty="0"/>
           </a:p>
@@ -2634,62 +2610,8 @@
           <a:p>
             <a:r>
               <a:rPr lang="en-US" dirty="0"/>
-              <a:t>First, download and install the latest NVIDIA GPU studio driver for your GPU on Windows to the latest version. To do this, I recommend using the NVIDIA App. Be sure to select the Studio version of the Driver as Studio drivers are optimized for compute-intensive tasks that leverage the GPU for general-purpose computing.</a:t>
-            </a:r>
-          </a:p>
-          <a:p>
-            <a:endParaRPr lang="en-US" dirty="0"/>
-          </a:p>
-          <a:p>
-            <a:pPr marL="0" marR="0" lvl="0" indent="0" algn="l" defTabSz="914400" rtl="0" eaLnBrk="1" fontAlgn="auto" latinLnBrk="0" hangingPunct="1">
-              <a:lnSpc>
-                <a:spcPct val="100000"/>
-              </a:lnSpc>
-              <a:spcBef>
-                <a:spcPts val="0"/>
-              </a:spcBef>
-              <a:spcAft>
-                <a:spcPts val="0"/>
-              </a:spcAft>
-              <a:buClrTx/>
-              <a:buSzTx/>
-              <a:buFontTx/>
-              <a:buNone/>
-              <a:tabLst/>
-              <a:defRPr/>
-            </a:pPr>
-            <a:r>
-              <a:rPr lang="en-US" dirty="0"/>
-              <a:t>Once the driver is installed, run the Windows command and validate the driver version and the CUDA Version line. The CUDA version shown is the maximum toolkit level your driver supports. It’s generally fine to use a matching or slightly older CUDA toolkit in WSL2.</a:t>
-            </a:r>
-          </a:p>
-          <a:p>
-            <a:endParaRPr lang="en-US" dirty="0"/>
-          </a:p>
-          <a:p>
-            <a:pPr marL="0" marR="0" lvl="0" indent="0" algn="l" defTabSz="914400" rtl="0" eaLnBrk="1" fontAlgn="auto" latinLnBrk="0" hangingPunct="1">
-              <a:lnSpc>
-                <a:spcPct val="100000"/>
-              </a:lnSpc>
-              <a:spcBef>
-                <a:spcPts val="0"/>
-              </a:spcBef>
-              <a:spcAft>
-                <a:spcPts val="0"/>
-              </a:spcAft>
-              <a:buClrTx/>
-              <a:buSzTx/>
-              <a:buFontTx/>
-              <a:buNone/>
-              <a:tabLst/>
-              <a:defRPr/>
-            </a:pPr>
-            <a:r>
-              <a:rPr lang="en-US" dirty="0"/>
-              <a:t>The NVIDIA GPU Drivers are backwards compatible with older CUDA versions.</a:t>
-            </a:r>
-          </a:p>
-          <a:p>
+              <a:t>First, download and install the latest NVIDIA GPU studio driver for your GPU on Windows to the latest version. To do this, I recommend using the NVIDIA App. Be sure to select the Studio version of the Driver as Studio drivers are optimized for compute-intensive tasks. Once the driver is installed, run the Windows command and validate the driver version and the CUDA Version line. The CUDA version shown is the maximum toolkit level your driver supports.</a:t>
+            </a:r>
             <a:endParaRPr dirty="0"/>
           </a:p>
           <a:p>
@@ -2764,13 +2686,35 @@
           <a:bodyPr/>
           <a:lstStyle/>
           <a:p>
+            <a:r>
+              <a:rPr lang="en-US" dirty="0"/>
+              <a:t>In this section, </a:t>
+            </a:r>
+            <a:r>
+              <a:rPr dirty="0"/>
+              <a:t>we</a:t>
+            </a:r>
+            <a:r>
+              <a:rPr lang="en-US" dirty="0"/>
+              <a:t> will</a:t>
+            </a:r>
+            <a:r>
+              <a:rPr dirty="0"/>
+              <a:t> install </a:t>
+            </a:r>
+            <a:r>
+              <a:rPr lang="en-US" dirty="0"/>
+              <a:t>Ubuntu and </a:t>
+            </a:r>
+            <a:r>
+              <a:rPr dirty="0"/>
+              <a:t>WSL2.</a:t>
+            </a:r>
+            <a:r>
+              <a:rPr lang="en-US" dirty="0"/>
+              <a:t>  Ubuntu is a full Linux Distribution that includes the source code for the operating system, inclusive of the shell, tools, compilers and libraries.  WSL2 enables Windows to run Linux distributions, like Ubuntu, natively on Windows 11.</a:t>
+            </a:r>
             <a:endParaRPr dirty="0"/>
-          </a:p>
-          <a:p>
-            <a:r>
-              <a:rPr dirty="0"/>
-              <a:t>Now we’ll install WSL2 with Ubuntu.</a:t>
-            </a:r>
           </a:p>
         </p:txBody>
       </p:sp>
@@ -2843,61 +2787,15 @@
           <a:p>
             <a:r>
               <a:rPr lang="en-US" dirty="0"/>
-              <a:t>For this step, Run a PowerShell as administrator and run the commands individually in sequence.  </a:t>
-            </a:r>
-          </a:p>
-          <a:p>
-            <a:endParaRPr lang="en-US" dirty="0"/>
-          </a:p>
-          <a:p>
-            <a:pPr marL="0" marR="0" lvl="0" indent="0" algn="l" defTabSz="914400" rtl="0" eaLnBrk="1" fontAlgn="auto" latinLnBrk="0" hangingPunct="1">
-              <a:lnSpc>
-                <a:spcPct val="100000"/>
-              </a:lnSpc>
-              <a:spcBef>
-                <a:spcPts val="0"/>
-              </a:spcBef>
-              <a:spcAft>
-                <a:spcPts val="0"/>
-              </a:spcAft>
-              <a:buClrTx/>
-              <a:buSzTx/>
-              <a:buFontTx/>
-              <a:buNone/>
-              <a:tabLst/>
-              <a:defRPr/>
-            </a:pPr>
-            <a:r>
-              <a:rPr lang="en-US" dirty="0"/>
-              <a:t>The first command enables the Virtual Machine Platform.  The second command enables the Windows Subsystem for Linux (WSL)… and the third command installs a WSL2 Linux distribution.</a:t>
-            </a:r>
-          </a:p>
-          <a:p>
-            <a:endParaRPr lang="en-US" dirty="0"/>
-          </a:p>
-          <a:p>
-            <a:r>
-              <a:rPr lang="en-US" dirty="0"/>
-              <a:t>You will be prompted to enter a username and password for the environment – record this for later.</a:t>
-            </a:r>
-          </a:p>
-          <a:p>
-            <a:endParaRPr lang="en-US" dirty="0"/>
-          </a:p>
-          <a:p>
+              <a:t>For this step, Run a PowerShell as an administrator and run the commands individually in sequence.  The first command enables the Windows Virtual Machine Platform, and the second enables the Windows Subsystem for Linux (WSL) feature.  The third command installs a WSL2 Linux distribution – in this case, Ubuntu. You will be prompted to enter a username and password for the environment, do so and record this for reference. </a:t>
+            </a:r>
             <a:r>
               <a:rPr dirty="0"/>
               <a:t>After setup, you’ll be able to open Ubuntu from the Start menu or Windows Terminal.</a:t>
             </a:r>
-            <a:endParaRPr lang="en-US" dirty="0"/>
-          </a:p>
-          <a:p>
-            <a:endParaRPr lang="en-US" dirty="0"/>
-          </a:p>
-          <a:p>
             <a:r>
               <a:rPr lang="en-US" dirty="0"/>
-              <a:t>Reboot if prompted.</a:t>
+              <a:t>  Reboot if prompted.</a:t>
             </a:r>
             <a:endParaRPr dirty="0"/>
           </a:p>
@@ -2967,16 +2865,21 @@
           <a:bodyPr/>
           <a:lstStyle/>
           <a:p>
-            <a:endParaRPr dirty="0"/>
-          </a:p>
-          <a:p>
             <a:r>
               <a:rPr lang="en-US" dirty="0"/>
               <a:t>In this section, </a:t>
             </a:r>
             <a:r>
               <a:rPr dirty="0"/>
-              <a:t>we’ll install the CUDA toolkit that matches </a:t>
+              <a:t>we’ll install the CUDA toolkit </a:t>
+            </a:r>
+            <a:r>
+              <a:rPr lang="en-US" dirty="0"/>
+              <a:t>in the Ubuntu environment that</a:t>
+            </a:r>
+            <a:r>
+              <a:rPr dirty="0"/>
+              <a:t> matches </a:t>
             </a:r>
             <a:r>
               <a:rPr lang="en-US" dirty="0"/>
@@ -2986,6 +2889,11 @@
               <a:rPr dirty="0"/>
               <a:t> Windows driver capability. Then we’ll set PATH and library variables so compilers and TensorFlow find CUDA.</a:t>
             </a:r>
+            <a:r>
+              <a:rPr lang="en-US" dirty="0"/>
+              <a:t>  If you do not already have an Ubuntu terminal running, go ahead and launch one from the Windows Start menu now as the commands on the next slide will be run from within the Ubuntu environment.</a:t>
+            </a:r>
+            <a:endParaRPr dirty="0"/>
           </a:p>
         </p:txBody>
       </p:sp>
@@ -3142,7 +3050,7 @@
           <a:p>
             <a:fld id="{5BCAD085-E8A6-8845-BD4E-CB4CCA059FC4}" type="datetimeFigureOut">
               <a:rPr lang="en-US" smtClean="0"/>
-              <a:t>7/26/2025</a:t>
+              <a:t>7/29/2025</a:t>
             </a:fld>
             <a:endParaRPr lang="en-US" dirty="0"/>
           </a:p>
@@ -3428,7 +3336,7 @@
           <a:p>
             <a:fld id="{5BCAD085-E8A6-8845-BD4E-CB4CCA059FC4}" type="datetimeFigureOut">
               <a:rPr lang="en-US" smtClean="0"/>
-              <a:t>7/26/2025</a:t>
+              <a:t>7/29/2025</a:t>
             </a:fld>
             <a:endParaRPr lang="en-US" dirty="0"/>
           </a:p>
@@ -3620,7 +3528,7 @@
           <a:p>
             <a:fld id="{5BCAD085-E8A6-8845-BD4E-CB4CCA059FC4}" type="datetimeFigureOut">
               <a:rPr lang="en-US" smtClean="0"/>
-              <a:t>7/26/2025</a:t>
+              <a:t>7/29/2025</a:t>
             </a:fld>
             <a:endParaRPr lang="en-US" dirty="0"/>
           </a:p>
@@ -3881,7 +3789,7 @@
           <a:p>
             <a:fld id="{5BCAD085-E8A6-8845-BD4E-CB4CCA059FC4}" type="datetimeFigureOut">
               <a:rPr lang="en-US" smtClean="0"/>
-              <a:t>7/26/2025</a:t>
+              <a:t>7/29/2025</a:t>
             </a:fld>
             <a:endParaRPr lang="en-US" dirty="0"/>
           </a:p>
@@ -4305,7 +4213,7 @@
           <a:p>
             <a:fld id="{5BCAD085-E8A6-8845-BD4E-CB4CCA059FC4}" type="datetimeFigureOut">
               <a:rPr lang="en-US" smtClean="0"/>
-              <a:t>7/26/2025</a:t>
+              <a:t>7/29/2025</a:t>
             </a:fld>
             <a:endParaRPr lang="en-US" dirty="0"/>
           </a:p>
@@ -4851,7 +4759,7 @@
           <a:p>
             <a:fld id="{5BCAD085-E8A6-8845-BD4E-CB4CCA059FC4}" type="datetimeFigureOut">
               <a:rPr lang="en-US" smtClean="0"/>
-              <a:t>7/26/2025</a:t>
+              <a:t>7/29/2025</a:t>
             </a:fld>
             <a:endParaRPr lang="en-US" dirty="0"/>
           </a:p>
@@ -5688,7 +5596,7 @@
           <a:p>
             <a:fld id="{5BCAD085-E8A6-8845-BD4E-CB4CCA059FC4}" type="datetimeFigureOut">
               <a:rPr lang="en-US" smtClean="0"/>
-              <a:t>7/26/2025</a:t>
+              <a:t>7/29/2025</a:t>
             </a:fld>
             <a:endParaRPr lang="en-US" dirty="0"/>
           </a:p>
@@ -5858,7 +5766,7 @@
           <a:p>
             <a:fld id="{5BCAD085-E8A6-8845-BD4E-CB4CCA059FC4}" type="datetimeFigureOut">
               <a:rPr lang="en-US" smtClean="0"/>
-              <a:t>7/26/2025</a:t>
+              <a:t>7/29/2025</a:t>
             </a:fld>
             <a:endParaRPr lang="en-US" dirty="0"/>
           </a:p>
@@ -6042,7 +5950,7 @@
           <a:p>
             <a:fld id="{5BCAD085-E8A6-8845-BD4E-CB4CCA059FC4}" type="datetimeFigureOut">
               <a:rPr lang="en-US" smtClean="0"/>
-              <a:t>7/26/2025</a:t>
+              <a:t>7/29/2025</a:t>
             </a:fld>
             <a:endParaRPr lang="en-US" dirty="0"/>
           </a:p>
@@ -6212,7 +6120,7 @@
           <a:p>
             <a:fld id="{5BCAD085-E8A6-8845-BD4E-CB4CCA059FC4}" type="datetimeFigureOut">
               <a:rPr lang="en-US" smtClean="0"/>
-              <a:t>7/26/2025</a:t>
+              <a:t>7/29/2025</a:t>
             </a:fld>
             <a:endParaRPr lang="en-US" dirty="0"/>
           </a:p>
@@ -6460,7 +6368,7 @@
           <a:p>
             <a:fld id="{5BCAD085-E8A6-8845-BD4E-CB4CCA059FC4}" type="datetimeFigureOut">
               <a:rPr lang="en-US" smtClean="0"/>
-              <a:t>7/26/2025</a:t>
+              <a:t>7/29/2025</a:t>
             </a:fld>
             <a:endParaRPr lang="en-US" dirty="0"/>
           </a:p>
@@ -6697,7 +6605,7 @@
           <a:p>
             <a:fld id="{5BCAD085-E8A6-8845-BD4E-CB4CCA059FC4}" type="datetimeFigureOut">
               <a:rPr lang="en-US" smtClean="0"/>
-              <a:t>7/26/2025</a:t>
+              <a:t>7/29/2025</a:t>
             </a:fld>
             <a:endParaRPr lang="en-US" dirty="0"/>
           </a:p>
@@ -7070,7 +6978,7 @@
           <a:p>
             <a:fld id="{5BCAD085-E8A6-8845-BD4E-CB4CCA059FC4}" type="datetimeFigureOut">
               <a:rPr lang="en-US" smtClean="0"/>
-              <a:t>7/26/2025</a:t>
+              <a:t>7/29/2025</a:t>
             </a:fld>
             <a:endParaRPr lang="en-US" dirty="0"/>
           </a:p>
@@ -7188,7 +7096,7 @@
           <a:p>
             <a:fld id="{5BCAD085-E8A6-8845-BD4E-CB4CCA059FC4}" type="datetimeFigureOut">
               <a:rPr lang="en-US" smtClean="0"/>
-              <a:t>7/26/2025</a:t>
+              <a:t>7/29/2025</a:t>
             </a:fld>
             <a:endParaRPr lang="en-US" dirty="0"/>
           </a:p>
@@ -7283,7 +7191,7 @@
           <a:p>
             <a:fld id="{5BCAD085-E8A6-8845-BD4E-CB4CCA059FC4}" type="datetimeFigureOut">
               <a:rPr lang="en-US" smtClean="0"/>
-              <a:t>7/26/2025</a:t>
+              <a:t>7/29/2025</a:t>
             </a:fld>
             <a:endParaRPr lang="en-US" dirty="0"/>
           </a:p>
@@ -7534,7 +7442,7 @@
           <a:p>
             <a:fld id="{5BCAD085-E8A6-8845-BD4E-CB4CCA059FC4}" type="datetimeFigureOut">
               <a:rPr lang="en-US" smtClean="0"/>
-              <a:t>7/26/2025</a:t>
+              <a:t>7/29/2025</a:t>
             </a:fld>
             <a:endParaRPr lang="en-US" dirty="0"/>
           </a:p>
@@ -7820,7 +7728,7 @@
           <a:p>
             <a:fld id="{5BCAD085-E8A6-8845-BD4E-CB4CCA059FC4}" type="datetimeFigureOut">
               <a:rPr lang="en-US" smtClean="0"/>
-              <a:t>7/26/2025</a:t>
+              <a:t>7/29/2025</a:t>
             </a:fld>
             <a:endParaRPr lang="en-US" dirty="0"/>
           </a:p>
@@ -8033,7 +7941,7 @@
           <a:p>
             <a:fld id="{5BCAD085-E8A6-8845-BD4E-CB4CCA059FC4}" type="datetimeFigureOut">
               <a:rPr lang="en-US" smtClean="0"/>
-              <a:t>7/26/2025</a:t>
+              <a:t>7/29/2025</a:t>
             </a:fld>
             <a:endParaRPr lang="en-US" dirty="0"/>
           </a:p>
@@ -11061,18 +10969,23 @@
         </p:spPr>
         <p:txBody>
           <a:bodyPr>
-            <a:normAutofit/>
+            <a:normAutofit fontScale="90000"/>
           </a:bodyPr>
           <a:lstStyle/>
           <a:p>
             <a:r>
               <a:rPr lang="en-US" dirty="0"/>
-              <a:t>Open your Environment in </a:t>
+              <a:t>PROGRAM in your Ubuntu Environment from </a:t>
             </a:r>
             <a:r>
               <a:rPr dirty="0"/>
               <a:t>VS Code</a:t>
             </a:r>
+            <a:r>
+              <a:rPr lang="en-US" dirty="0"/>
+              <a:t> In Windows</a:t>
+            </a:r>
+            <a:endParaRPr dirty="0"/>
           </a:p>
         </p:txBody>
       </p:sp>
@@ -11368,11 +11281,11 @@
           <a:p>
             <a:r>
               <a:rPr dirty="0"/>
-              <a:t>Why WSL2 for TensorFlow GPU</a:t>
+              <a:t>TensorFlow </a:t>
             </a:r>
             <a:r>
               <a:rPr lang="en-US" dirty="0"/>
-              <a:t>?</a:t>
+              <a:t>No Longer supports windows natively</a:t>
             </a:r>
             <a:endParaRPr dirty="0"/>
           </a:p>
@@ -12094,6 +12007,78 @@
 </p:sld>
 </file>
 
+<file path=ppt/slides/slide26.xml><?xml version="1.0" encoding="utf-8"?>
+<p:sld xmlns:a="http://schemas.openxmlformats.org/drawingml/2006/main" xmlns:r="http://schemas.openxmlformats.org/officeDocument/2006/relationships" xmlns:p="http://schemas.openxmlformats.org/presentationml/2006/main">
+  <p:cSld>
+    <p:spTree>
+      <p:nvGrpSpPr>
+        <p:cNvPr id="1" name="">
+          <a:extLst>
+            <a:ext uri="{FF2B5EF4-FFF2-40B4-BE49-F238E27FC236}">
+              <a16:creationId xmlns:a16="http://schemas.microsoft.com/office/drawing/2014/main" id="{9B3D81AA-E305-88F2-D65D-19765BC869FC}"/>
+            </a:ext>
+          </a:extLst>
+        </p:cNvPr>
+        <p:cNvGrpSpPr/>
+        <p:nvPr/>
+      </p:nvGrpSpPr>
+      <p:grpSpPr>
+        <a:xfrm>
+          <a:off x="0" y="0"/>
+          <a:ext cx="0" cy="0"/>
+          <a:chOff x="0" y="0"/>
+          <a:chExt cx="0" cy="0"/>
+        </a:xfrm>
+      </p:grpSpPr>
+      <p:sp>
+        <p:nvSpPr>
+          <p:cNvPr id="2" name="Title 1">
+            <a:extLst>
+              <a:ext uri="{FF2B5EF4-FFF2-40B4-BE49-F238E27FC236}">
+                <a16:creationId xmlns:a16="http://schemas.microsoft.com/office/drawing/2014/main" id="{68858715-7762-DCAF-9D26-7009BF89C527}"/>
+              </a:ext>
+            </a:extLst>
+          </p:cNvPr>
+          <p:cNvSpPr>
+            <a:spLocks noGrp="1"/>
+          </p:cNvSpPr>
+          <p:nvPr>
+            <p:ph type="title"/>
+          </p:nvPr>
+        </p:nvSpPr>
+        <p:spPr>
+          <a:xfrm>
+            <a:off x="457200" y="2857500"/>
+            <a:ext cx="8229600" cy="1143000"/>
+          </a:xfrm>
+        </p:spPr>
+        <p:txBody>
+          <a:bodyPr>
+            <a:normAutofit/>
+          </a:bodyPr>
+          <a:lstStyle/>
+          <a:p>
+            <a:r>
+              <a:rPr lang="en-US" dirty="0"/>
+              <a:t>Thank you!</a:t>
+            </a:r>
+            <a:endParaRPr dirty="0"/>
+          </a:p>
+        </p:txBody>
+      </p:sp>
+    </p:spTree>
+    <p:extLst>
+      <p:ext uri="{BB962C8B-B14F-4D97-AF65-F5344CB8AC3E}">
+        <p14:creationId xmlns:p14="http://schemas.microsoft.com/office/powerpoint/2010/main" val="98206679"/>
+      </p:ext>
+    </p:extLst>
+  </p:cSld>
+  <p:clrMapOvr>
+    <a:masterClrMapping/>
+  </p:clrMapOvr>
+</p:sld>
+</file>
+
 <file path=ppt/slides/slide3.xml><?xml version="1.0" encoding="utf-8"?>
 <p:sld xmlns:a="http://schemas.openxmlformats.org/drawingml/2006/main" xmlns:r="http://schemas.openxmlformats.org/officeDocument/2006/relationships" xmlns:p="http://schemas.openxmlformats.org/presentationml/2006/main">
   <p:cSld>
@@ -12732,7 +12717,7 @@
         <p:spPr>
           <a:xfrm>
             <a:off x="4155535" y="1851660"/>
-            <a:ext cx="4622705" cy="1648918"/>
+            <a:ext cx="4966176" cy="1771434"/>
           </a:xfrm>
           <a:prstGeom prst="rect">
             <a:avLst/>
@@ -12761,8 +12746,8 @@
         </p:blipFill>
         <p:spPr>
           <a:xfrm>
-            <a:off x="4155535" y="4122494"/>
-            <a:ext cx="4622705" cy="2270612"/>
+            <a:off x="4155535" y="4122493"/>
+            <a:ext cx="4859069" cy="2386711"/>
           </a:xfrm>
           <a:prstGeom prst="rect">
             <a:avLst/>
@@ -12867,8 +12852,13 @@
             </a:r>
             <a:r>
               <a:rPr dirty="0"/>
-              <a:t>WSL2 &amp; Ubuntu</a:t>
-            </a:r>
+              <a:t>Ubuntu</a:t>
+            </a:r>
+            <a:r>
+              <a:rPr lang="en-US" dirty="0"/>
+              <a:t> on WSL2</a:t>
+            </a:r>
+            <a:endParaRPr dirty="0"/>
           </a:p>
         </p:txBody>
       </p:sp>
@@ -12927,8 +12917,8 @@
         </p:nvSpPr>
         <p:spPr>
           <a:xfrm>
-            <a:off x="457199" y="5557822"/>
-            <a:ext cx="8229599" cy="323165"/>
+            <a:off x="457200" y="5359419"/>
+            <a:ext cx="4347716" cy="323165"/>
           </a:xfrm>
           <a:prstGeom prst="rect">
             <a:avLst/>
@@ -13010,8 +13000,8 @@
         </p:nvSpPr>
         <p:spPr>
           <a:xfrm>
-            <a:off x="457201" y="3136366"/>
-            <a:ext cx="8229599" cy="553998"/>
+            <a:off x="457202" y="2937963"/>
+            <a:ext cx="4347712" cy="784830"/>
           </a:xfrm>
           <a:prstGeom prst="rect">
             <a:avLst/>
@@ -13059,8 +13049,8 @@
         </p:nvSpPr>
         <p:spPr>
           <a:xfrm>
-            <a:off x="457200" y="4347094"/>
-            <a:ext cx="8229599" cy="553998"/>
+            <a:off x="457201" y="4148691"/>
+            <a:ext cx="4347714" cy="784830"/>
           </a:xfrm>
           <a:prstGeom prst="rect">
             <a:avLst/>
@@ -13093,6 +13083,36 @@
           </a:p>
         </p:txBody>
       </p:sp>
+      <p:pic>
+        <p:nvPicPr>
+          <p:cNvPr id="5" name="Picture 4">
+            <a:extLst>
+              <a:ext uri="{FF2B5EF4-FFF2-40B4-BE49-F238E27FC236}">
+                <a16:creationId xmlns:a16="http://schemas.microsoft.com/office/drawing/2014/main" id="{12F8730A-8688-BB78-5FB2-C151C06DA91B}"/>
+              </a:ext>
+            </a:extLst>
+          </p:cNvPr>
+          <p:cNvPicPr>
+            <a:picLocks noChangeAspect="1"/>
+          </p:cNvPicPr>
+          <p:nvPr/>
+        </p:nvPicPr>
+        <p:blipFill>
+          <a:blip r:embed="rId3"/>
+          <a:stretch>
+            <a:fillRect/>
+          </a:stretch>
+        </p:blipFill>
+        <p:spPr>
+          <a:xfrm>
+            <a:off x="4872989" y="2937963"/>
+            <a:ext cx="4128906" cy="3692106"/>
+          </a:xfrm>
+          <a:prstGeom prst="rect">
+            <a:avLst/>
+          </a:prstGeom>
+        </p:spPr>
+      </p:pic>
     </p:spTree>
   </p:cSld>
   <p:clrMapOvr>

</xml_diff>

<commit_message>
Guide in Presentation Form
Guide in Presentation Form
</commit_message>
<xml_diff>
--- a/Presenation_TensorFlowOnWindows11forGPU.pptx
+++ b/Presenation_TensorFlowOnWindows11forGPU.pptx
@@ -5,7 +5,7 @@
     <p:sldMasterId id="2147483660" r:id="rId1"/>
   </p:sldMasterIdLst>
   <p:notesMasterIdLst>
-    <p:notesMasterId r:id="rId28"/>
+    <p:notesMasterId r:id="rId30"/>
   </p:notesMasterIdLst>
   <p:sldIdLst>
     <p:sldId id="256" r:id="rId2"/>
@@ -33,7 +33,9 @@
     <p:sldId id="271" r:id="rId24"/>
     <p:sldId id="274" r:id="rId25"/>
     <p:sldId id="275" r:id="rId26"/>
-    <p:sldId id="289" r:id="rId27"/>
+    <p:sldId id="290" r:id="rId27"/>
+    <p:sldId id="291" r:id="rId28"/>
+    <p:sldId id="289" r:id="rId29"/>
   </p:sldIdLst>
   <p:sldSz cx="9144000" cy="6858000" type="screen4x3"/>
   <p:notesSz cx="6858000" cy="9144000"/>
@@ -2186,6 +2188,239 @@
 </file>
 
 <file path=ppt/notesSlides/notesSlide26.xml><?xml version="1.0" encoding="utf-8"?>
+<p:notes xmlns:a="http://schemas.openxmlformats.org/drawingml/2006/main" xmlns:r="http://schemas.openxmlformats.org/officeDocument/2006/relationships" xmlns:p="http://schemas.openxmlformats.org/presentationml/2006/main">
+  <p:cSld>
+    <p:spTree>
+      <p:nvGrpSpPr>
+        <p:cNvPr id="1" name="">
+          <a:extLst>
+            <a:ext uri="{FF2B5EF4-FFF2-40B4-BE49-F238E27FC236}">
+              <a16:creationId xmlns:a16="http://schemas.microsoft.com/office/drawing/2014/main" id="{026DFE6A-B58D-4361-EDF8-E24C2B7C8D6D}"/>
+            </a:ext>
+          </a:extLst>
+        </p:cNvPr>
+        <p:cNvGrpSpPr/>
+        <p:nvPr/>
+      </p:nvGrpSpPr>
+      <p:grpSpPr>
+        <a:xfrm>
+          <a:off x="0" y="0"/>
+          <a:ext cx="0" cy="0"/>
+          <a:chOff x="0" y="0"/>
+          <a:chExt cx="0" cy="0"/>
+        </a:xfrm>
+      </p:grpSpPr>
+      <p:sp>
+        <p:nvSpPr>
+          <p:cNvPr id="2" name="Slide Image Placeholder 1">
+            <a:extLst>
+              <a:ext uri="{FF2B5EF4-FFF2-40B4-BE49-F238E27FC236}">
+                <a16:creationId xmlns:a16="http://schemas.microsoft.com/office/drawing/2014/main" id="{99A5695B-9040-C2E9-4313-F6B8FD48B8D3}"/>
+              </a:ext>
+            </a:extLst>
+          </p:cNvPr>
+          <p:cNvSpPr>
+            <a:spLocks noGrp="1" noRot="1" noChangeAspect="1"/>
+          </p:cNvSpPr>
+          <p:nvPr>
+            <p:ph type="sldImg" idx="2"/>
+          </p:nvPr>
+        </p:nvSpPr>
+        <p:spPr/>
+      </p:sp>
+      <p:sp>
+        <p:nvSpPr>
+          <p:cNvPr id="3" name="Notes Placeholder 2">
+            <a:extLst>
+              <a:ext uri="{FF2B5EF4-FFF2-40B4-BE49-F238E27FC236}">
+                <a16:creationId xmlns:a16="http://schemas.microsoft.com/office/drawing/2014/main" id="{7ED47FB6-25EA-332B-5D84-E5D4F74A5A01}"/>
+              </a:ext>
+            </a:extLst>
+          </p:cNvPr>
+          <p:cNvSpPr>
+            <a:spLocks noGrp="1"/>
+          </p:cNvSpPr>
+          <p:nvPr>
+            <p:ph type="body" sz="quarter" idx="3"/>
+          </p:nvPr>
+        </p:nvSpPr>
+        <p:spPr/>
+        <p:txBody>
+          <a:bodyPr/>
+          <a:lstStyle/>
+          <a:p>
+            <a:r>
+              <a:rPr lang="en-US" sz="1200" b="0" kern="1200" dirty="0">
+                <a:solidFill>
+                  <a:schemeClr val="tx1"/>
+                </a:solidFill>
+                <a:effectLst/>
+                <a:latin typeface="+mn-lt"/>
+                <a:ea typeface="+mn-ea"/>
+                <a:cs typeface="+mn-cs"/>
+              </a:rPr>
+              <a:t>I used this project as a vehicle to explore AI services.  Google Gemini proved a valuable resource in educating me on the possibilities of Linux on Windows, and suggesting installation and configuration commands.  ChatGPT did a poor job of converting my guide summary to PowerPoint, which required a full overhaul.  While tedious, using a custom Python notebook to process the speech-to-text task and store the resulting .MP3 was efficient. Manually importing the audio and configuring the PowerPoint as a video was busywork. In the future, I will create an AI Agent to </a:t>
+            </a:r>
+            <a:r>
+              <a:rPr lang="en-US" sz="1200" b="0" kern="1200" dirty="0" err="1">
+                <a:solidFill>
+                  <a:schemeClr val="tx1"/>
+                </a:solidFill>
+                <a:effectLst/>
+                <a:latin typeface="+mn-lt"/>
+                <a:ea typeface="+mn-ea"/>
+                <a:cs typeface="+mn-cs"/>
+              </a:rPr>
+              <a:t>recieve</a:t>
+            </a:r>
+            <a:r>
+              <a:rPr lang="en-US" sz="1200" b="0" kern="1200" dirty="0">
+                <a:solidFill>
+                  <a:schemeClr val="tx1"/>
+                </a:solidFill>
+                <a:effectLst/>
+                <a:latin typeface="+mn-lt"/>
+                <a:ea typeface="+mn-ea"/>
+                <a:cs typeface="+mn-cs"/>
+              </a:rPr>
+              <a:t> a PowerPoint file and process the conversion to a narrated video, automatically.</a:t>
+            </a:r>
+          </a:p>
+        </p:txBody>
+      </p:sp>
+      <p:sp>
+        <p:nvSpPr>
+          <p:cNvPr id="4" name="Slide Number Placeholder 3">
+            <a:extLst>
+              <a:ext uri="{FF2B5EF4-FFF2-40B4-BE49-F238E27FC236}">
+                <a16:creationId xmlns:a16="http://schemas.microsoft.com/office/drawing/2014/main" id="{1D69E2B2-28BE-7E8D-6C83-454040B42516}"/>
+              </a:ext>
+            </a:extLst>
+          </p:cNvPr>
+          <p:cNvSpPr>
+            <a:spLocks noGrp="1"/>
+          </p:cNvSpPr>
+          <p:nvPr>
+            <p:ph type="sldNum" sz="quarter" idx="5"/>
+          </p:nvPr>
+        </p:nvSpPr>
+        <p:spPr/>
+      </p:sp>
+    </p:spTree>
+    <p:extLst>
+      <p:ext uri="{BB962C8B-B14F-4D97-AF65-F5344CB8AC3E}">
+        <p14:creationId xmlns:p14="http://schemas.microsoft.com/office/powerpoint/2010/main" val="1388175932"/>
+      </p:ext>
+    </p:extLst>
+  </p:cSld>
+  <p:clrMapOvr>
+    <a:masterClrMapping/>
+  </p:clrMapOvr>
+</p:notes>
+</file>
+
+<file path=ppt/notesSlides/notesSlide27.xml><?xml version="1.0" encoding="utf-8"?>
+<p:notes xmlns:a="http://schemas.openxmlformats.org/drawingml/2006/main" xmlns:r="http://schemas.openxmlformats.org/officeDocument/2006/relationships" xmlns:p="http://schemas.openxmlformats.org/presentationml/2006/main">
+  <p:cSld>
+    <p:spTree>
+      <p:nvGrpSpPr>
+        <p:cNvPr id="1" name="">
+          <a:extLst>
+            <a:ext uri="{FF2B5EF4-FFF2-40B4-BE49-F238E27FC236}">
+              <a16:creationId xmlns:a16="http://schemas.microsoft.com/office/drawing/2014/main" id="{FEE6B341-EE14-03D2-38E1-943A8FC1084A}"/>
+            </a:ext>
+          </a:extLst>
+        </p:cNvPr>
+        <p:cNvGrpSpPr/>
+        <p:nvPr/>
+      </p:nvGrpSpPr>
+      <p:grpSpPr>
+        <a:xfrm>
+          <a:off x="0" y="0"/>
+          <a:ext cx="0" cy="0"/>
+          <a:chOff x="0" y="0"/>
+          <a:chExt cx="0" cy="0"/>
+        </a:xfrm>
+      </p:grpSpPr>
+      <p:sp>
+        <p:nvSpPr>
+          <p:cNvPr id="2" name="Slide Image Placeholder 1">
+            <a:extLst>
+              <a:ext uri="{FF2B5EF4-FFF2-40B4-BE49-F238E27FC236}">
+                <a16:creationId xmlns:a16="http://schemas.microsoft.com/office/drawing/2014/main" id="{1FFD8250-DEA2-F14B-F9A5-A98337518D28}"/>
+              </a:ext>
+            </a:extLst>
+          </p:cNvPr>
+          <p:cNvSpPr>
+            <a:spLocks noGrp="1" noRot="1" noChangeAspect="1"/>
+          </p:cNvSpPr>
+          <p:nvPr>
+            <p:ph type="sldImg" idx="2"/>
+          </p:nvPr>
+        </p:nvSpPr>
+        <p:spPr/>
+      </p:sp>
+      <p:sp>
+        <p:nvSpPr>
+          <p:cNvPr id="3" name="Notes Placeholder 2">
+            <a:extLst>
+              <a:ext uri="{FF2B5EF4-FFF2-40B4-BE49-F238E27FC236}">
+                <a16:creationId xmlns:a16="http://schemas.microsoft.com/office/drawing/2014/main" id="{ADD8BC19-4D33-78C0-7F63-B99DE0714981}"/>
+              </a:ext>
+            </a:extLst>
+          </p:cNvPr>
+          <p:cNvSpPr>
+            <a:spLocks noGrp="1"/>
+          </p:cNvSpPr>
+          <p:nvPr>
+            <p:ph type="body" sz="quarter" idx="3"/>
+          </p:nvPr>
+        </p:nvSpPr>
+        <p:spPr/>
+        <p:txBody>
+          <a:bodyPr/>
+          <a:lstStyle/>
+          <a:p>
+            <a:r>
+              <a:rPr lang="en-US" dirty="0"/>
+              <a:t>Please visit my portfolio at https://www.calanmurphy.com.</a:t>
+            </a:r>
+            <a:endParaRPr dirty="0"/>
+          </a:p>
+        </p:txBody>
+      </p:sp>
+      <p:sp>
+        <p:nvSpPr>
+          <p:cNvPr id="4" name="Slide Number Placeholder 3">
+            <a:extLst>
+              <a:ext uri="{FF2B5EF4-FFF2-40B4-BE49-F238E27FC236}">
+                <a16:creationId xmlns:a16="http://schemas.microsoft.com/office/drawing/2014/main" id="{89CA4321-00BB-C29E-071B-C5E653D296DC}"/>
+              </a:ext>
+            </a:extLst>
+          </p:cNvPr>
+          <p:cNvSpPr>
+            <a:spLocks noGrp="1"/>
+          </p:cNvSpPr>
+          <p:nvPr>
+            <p:ph type="sldNum" sz="quarter" idx="5"/>
+          </p:nvPr>
+        </p:nvSpPr>
+        <p:spPr/>
+      </p:sp>
+    </p:spTree>
+    <p:extLst>
+      <p:ext uri="{BB962C8B-B14F-4D97-AF65-F5344CB8AC3E}">
+        <p14:creationId xmlns:p14="http://schemas.microsoft.com/office/powerpoint/2010/main" val="2606206356"/>
+      </p:ext>
+    </p:extLst>
+  </p:cSld>
+  <p:clrMapOvr>
+    <a:masterClrMapping/>
+  </p:clrMapOvr>
+</p:notes>
+</file>
+
+<file path=ppt/notesSlides/notesSlide28.xml><?xml version="1.0" encoding="utf-8"?>
 <p:notes xmlns:a="http://schemas.openxmlformats.org/drawingml/2006/main" xmlns:r="http://schemas.openxmlformats.org/officeDocument/2006/relationships" xmlns:p="http://schemas.openxmlformats.org/presentationml/2006/main">
   <p:cSld>
     <p:spTree>
@@ -12004,10 +12239,309 @@
   <p:clrMapOvr>
     <a:masterClrMapping/>
   </p:clrMapOvr>
+  <mc:AlternateContent xmlns:mc="http://schemas.openxmlformats.org/markup-compatibility/2006">
+    <mc:Choice xmlns:p14="http://schemas.microsoft.com/office/powerpoint/2010/main" Requires="p14">
+      <p:transition spd="med" p14:dur="700">
+        <p:fade/>
+      </p:transition>
+    </mc:Choice>
+    <mc:Fallback>
+      <p:transition spd="med">
+        <p:fade/>
+      </p:transition>
+    </mc:Fallback>
+  </mc:AlternateContent>
 </p:sld>
 </file>
 
 <file path=ppt/slides/slide26.xml><?xml version="1.0" encoding="utf-8"?>
+<p:sld xmlns:a="http://schemas.openxmlformats.org/drawingml/2006/main" xmlns:r="http://schemas.openxmlformats.org/officeDocument/2006/relationships" xmlns:p="http://schemas.openxmlformats.org/presentationml/2006/main">
+  <p:cSld>
+    <p:spTree>
+      <p:nvGrpSpPr>
+        <p:cNvPr id="1" name="">
+          <a:extLst>
+            <a:ext uri="{FF2B5EF4-FFF2-40B4-BE49-F238E27FC236}">
+              <a16:creationId xmlns:a16="http://schemas.microsoft.com/office/drawing/2014/main" id="{F1F182CB-5C01-8BF7-A0F4-F72EF68D9FFC}"/>
+            </a:ext>
+          </a:extLst>
+        </p:cNvPr>
+        <p:cNvGrpSpPr/>
+        <p:nvPr/>
+      </p:nvGrpSpPr>
+      <p:grpSpPr>
+        <a:xfrm>
+          <a:off x="0" y="0"/>
+          <a:ext cx="0" cy="0"/>
+          <a:chOff x="0" y="0"/>
+          <a:chExt cx="0" cy="0"/>
+        </a:xfrm>
+      </p:grpSpPr>
+      <p:sp>
+        <p:nvSpPr>
+          <p:cNvPr id="2" name="Title 1">
+            <a:extLst>
+              <a:ext uri="{FF2B5EF4-FFF2-40B4-BE49-F238E27FC236}">
+                <a16:creationId xmlns:a16="http://schemas.microsoft.com/office/drawing/2014/main" id="{759A6730-01F0-E448-60EF-F5BE30EBCAAE}"/>
+              </a:ext>
+            </a:extLst>
+          </p:cNvPr>
+          <p:cNvSpPr>
+            <a:spLocks noGrp="1"/>
+          </p:cNvSpPr>
+          <p:nvPr>
+            <p:ph type="title"/>
+          </p:nvPr>
+        </p:nvSpPr>
+        <p:spPr/>
+        <p:txBody>
+          <a:bodyPr/>
+          <a:lstStyle/>
+          <a:p>
+            <a:r>
+              <a:rPr lang="en-US" dirty="0"/>
+              <a:t>CREATING this Presentation</a:t>
+            </a:r>
+            <a:endParaRPr dirty="0"/>
+          </a:p>
+        </p:txBody>
+      </p:sp>
+      <p:sp>
+        <p:nvSpPr>
+          <p:cNvPr id="3" name="Content Placeholder 2">
+            <a:extLst>
+              <a:ext uri="{FF2B5EF4-FFF2-40B4-BE49-F238E27FC236}">
+                <a16:creationId xmlns:a16="http://schemas.microsoft.com/office/drawing/2014/main" id="{29EC4845-5450-8222-B0AC-E2FD00377C26}"/>
+              </a:ext>
+            </a:extLst>
+          </p:cNvPr>
+          <p:cNvSpPr>
+            <a:spLocks noGrp="1"/>
+          </p:cNvSpPr>
+          <p:nvPr>
+            <p:ph idx="1"/>
+          </p:nvPr>
+        </p:nvSpPr>
+        <p:spPr/>
+        <p:txBody>
+          <a:bodyPr>
+            <a:normAutofit fontScale="92500" lnSpcReduction="20000"/>
+          </a:bodyPr>
+          <a:lstStyle/>
+          <a:p>
+            <a:pPr>
+              <a:defRPr sz="2000"/>
+            </a:pPr>
+            <a:r>
+              <a:rPr lang="en-US" dirty="0"/>
+              <a:t>I leveraged Google Gemini to investigate and verify the code used in this installation.</a:t>
+            </a:r>
+          </a:p>
+          <a:p>
+            <a:pPr>
+              <a:defRPr sz="2000"/>
+            </a:pPr>
+            <a:r>
+              <a:rPr lang="en-US" dirty="0"/>
+              <a:t>After manually creating a summary guide document, I utilized ChatGPT-4o to create a PowerPoint (PPTX) deck.</a:t>
+            </a:r>
+          </a:p>
+          <a:p>
+            <a:pPr>
+              <a:defRPr sz="2000"/>
+            </a:pPr>
+            <a:r>
+              <a:rPr lang="en-US" dirty="0"/>
+              <a:t>I manually updated the deck for content, presentation, slide notes (talking points), flow, pacing, and design.</a:t>
+            </a:r>
+          </a:p>
+          <a:p>
+            <a:pPr>
+              <a:defRPr sz="2000"/>
+            </a:pPr>
+            <a:r>
+              <a:rPr lang="en-US" dirty="0"/>
+              <a:t>I created a Python notebook in Google Colab to convert slide notes text to .MP3 audio using the Azure text-to-speech API.</a:t>
+            </a:r>
+          </a:p>
+          <a:p>
+            <a:pPr>
+              <a:defRPr sz="2000"/>
+            </a:pPr>
+            <a:r>
+              <a:rPr lang="en-US" dirty="0"/>
+              <a:t>I manually imported audio into each slide of the PPTX and configured playback settings and exported as a video</a:t>
+            </a:r>
+            <a:endParaRPr dirty="0"/>
+          </a:p>
+        </p:txBody>
+      </p:sp>
+    </p:spTree>
+    <p:extLst>
+      <p:ext uri="{BB962C8B-B14F-4D97-AF65-F5344CB8AC3E}">
+        <p14:creationId xmlns:p14="http://schemas.microsoft.com/office/powerpoint/2010/main" val="161029295"/>
+      </p:ext>
+    </p:extLst>
+  </p:cSld>
+  <p:clrMapOvr>
+    <a:masterClrMapping/>
+  </p:clrMapOvr>
+</p:sld>
+</file>
+
+<file path=ppt/slides/slide27.xml><?xml version="1.0" encoding="utf-8"?>
+<p:sld xmlns:a="http://schemas.openxmlformats.org/drawingml/2006/main" xmlns:r="http://schemas.openxmlformats.org/officeDocument/2006/relationships" xmlns:p="http://schemas.openxmlformats.org/presentationml/2006/main">
+  <p:cSld>
+    <p:spTree>
+      <p:nvGrpSpPr>
+        <p:cNvPr id="1" name="">
+          <a:extLst>
+            <a:ext uri="{FF2B5EF4-FFF2-40B4-BE49-F238E27FC236}">
+              <a16:creationId xmlns:a16="http://schemas.microsoft.com/office/drawing/2014/main" id="{5B3C7AAE-6E5C-FAA4-B2F4-476FC0F80B18}"/>
+            </a:ext>
+          </a:extLst>
+        </p:cNvPr>
+        <p:cNvGrpSpPr/>
+        <p:nvPr/>
+      </p:nvGrpSpPr>
+      <p:grpSpPr>
+        <a:xfrm>
+          <a:off x="0" y="0"/>
+          <a:ext cx="0" cy="0"/>
+          <a:chOff x="0" y="0"/>
+          <a:chExt cx="0" cy="0"/>
+        </a:xfrm>
+      </p:grpSpPr>
+      <p:sp>
+        <p:nvSpPr>
+          <p:cNvPr id="2" name="Title 1">
+            <a:extLst>
+              <a:ext uri="{FF2B5EF4-FFF2-40B4-BE49-F238E27FC236}">
+                <a16:creationId xmlns:a16="http://schemas.microsoft.com/office/drawing/2014/main" id="{E91BEE00-5FAF-9D49-7182-24FAF1A61097}"/>
+              </a:ext>
+            </a:extLst>
+          </p:cNvPr>
+          <p:cNvSpPr>
+            <a:spLocks noGrp="1"/>
+          </p:cNvSpPr>
+          <p:nvPr>
+            <p:ph type="title"/>
+          </p:nvPr>
+        </p:nvSpPr>
+        <p:spPr/>
+        <p:txBody>
+          <a:bodyPr/>
+          <a:lstStyle/>
+          <a:p>
+            <a:r>
+              <a:rPr lang="en-US" dirty="0"/>
+              <a:t>About Me</a:t>
+            </a:r>
+            <a:endParaRPr dirty="0"/>
+          </a:p>
+        </p:txBody>
+      </p:sp>
+      <p:sp>
+        <p:nvSpPr>
+          <p:cNvPr id="3" name="Content Placeholder 2">
+            <a:extLst>
+              <a:ext uri="{FF2B5EF4-FFF2-40B4-BE49-F238E27FC236}">
+                <a16:creationId xmlns:a16="http://schemas.microsoft.com/office/drawing/2014/main" id="{3EEA50BD-FADB-5E4D-B406-6329EA45D0EF}"/>
+              </a:ext>
+            </a:extLst>
+          </p:cNvPr>
+          <p:cNvSpPr>
+            <a:spLocks noGrp="1"/>
+          </p:cNvSpPr>
+          <p:nvPr>
+            <p:ph idx="1"/>
+          </p:nvPr>
+        </p:nvSpPr>
+        <p:spPr/>
+        <p:txBody>
+          <a:bodyPr/>
+          <a:lstStyle/>
+          <a:p>
+            <a:pPr marL="0" indent="0">
+              <a:buNone/>
+              <a:defRPr sz="2000"/>
+            </a:pPr>
+            <a:r>
+              <a:rPr lang="en-US" dirty="0"/>
+              <a:t>Christopher A. Murphy</a:t>
+            </a:r>
+          </a:p>
+          <a:p>
+            <a:pPr marL="0" indent="0">
+              <a:buNone/>
+              <a:defRPr sz="2000"/>
+            </a:pPr>
+            <a:r>
+              <a:rPr lang="en-US" dirty="0"/>
+              <a:t>Masters of Applied Data Science</a:t>
+            </a:r>
+          </a:p>
+          <a:p>
+            <a:pPr marL="0" indent="0">
+              <a:buNone/>
+              <a:defRPr sz="2000"/>
+            </a:pPr>
+            <a:endParaRPr lang="en-US" dirty="0"/>
+          </a:p>
+          <a:p>
+            <a:pPr marL="0" indent="0">
+              <a:buNone/>
+              <a:defRPr sz="2000"/>
+            </a:pPr>
+            <a:r>
+              <a:rPr lang="en-US" dirty="0"/>
+              <a:t>Please visit my project portfolio at the following URL:</a:t>
+            </a:r>
+          </a:p>
+          <a:p>
+            <a:pPr lvl="1">
+              <a:defRPr sz="2000"/>
+            </a:pPr>
+            <a:r>
+              <a:rPr lang="en-US" sz="2000" dirty="0"/>
+              <a:t>https://www.calanmurphy.com</a:t>
+            </a:r>
+          </a:p>
+          <a:p>
+            <a:pPr>
+              <a:defRPr sz="2000"/>
+            </a:pPr>
+            <a:r>
+              <a:rPr lang="en-US" dirty="0"/>
+              <a:t>Linked In:</a:t>
+            </a:r>
+          </a:p>
+          <a:p>
+            <a:pPr lvl="1">
+              <a:defRPr sz="2000"/>
+            </a:pPr>
+            <a:r>
+              <a:rPr lang="en-US" dirty="0"/>
+              <a:t>https://www.linkedin.com/in/christophermurphy/</a:t>
+            </a:r>
+            <a:endParaRPr dirty="0"/>
+          </a:p>
+        </p:txBody>
+      </p:sp>
+    </p:spTree>
+    <p:extLst>
+      <p:ext uri="{BB962C8B-B14F-4D97-AF65-F5344CB8AC3E}">
+        <p14:creationId xmlns:p14="http://schemas.microsoft.com/office/powerpoint/2010/main" val="150321790"/>
+      </p:ext>
+    </p:extLst>
+  </p:cSld>
+  <p:clrMapOvr>
+    <a:masterClrMapping/>
+  </p:clrMapOvr>
+</p:sld>
+</file>
+
+<file path=ppt/slides/slide28.xml><?xml version="1.0" encoding="utf-8"?>
 <p:sld xmlns:a="http://schemas.openxmlformats.org/drawingml/2006/main" xmlns:r="http://schemas.openxmlformats.org/officeDocument/2006/relationships" xmlns:p="http://schemas.openxmlformats.org/presentationml/2006/main">
   <p:cSld>
     <p:spTree>

</xml_diff>